<commit_message>
added hint from Dr. Holly
</commit_message>
<xml_diff>
--- a/ClassMaterials/MoreRecursionMoreInterfaces/Slides/Part1-More_Recursion.pptx
+++ b/ClassMaterials/MoreRecursionMoreInterfaces/Slides/Part1-More_Recursion.pptx
@@ -5,7 +5,7 @@
     <p:sldMasterId id="2147483648" r:id="rId4"/>
   </p:sldMasterIdLst>
   <p:notesMasterIdLst>
-    <p:notesMasterId r:id="rId19"/>
+    <p:notesMasterId r:id="rId20"/>
   </p:notesMasterIdLst>
   <p:sldIdLst>
     <p:sldId id="256" r:id="rId5"/>
@@ -22,6 +22,7 @@
     <p:sldId id="261" r:id="rId16"/>
     <p:sldId id="275" r:id="rId17"/>
     <p:sldId id="286" r:id="rId18"/>
+    <p:sldId id="287" r:id="rId19"/>
   </p:sldIdLst>
   <p:sldSz cx="9144000" cy="6858000" type="screen4x3"/>
   <p:notesSz cx="6858000" cy="9144000"/>
@@ -221,7 +222,7 @@
           <a:p>
             <a:fld id="{01A9AFE8-3E8D-E148-BA98-12759F2DD8EB}" type="datetimeFigureOut">
               <a:rPr lang="en-US" smtClean="0"/>
-              <a:t>11/22/2022</a:t>
+              <a:t>4/17/2023</a:t>
             </a:fld>
             <a:endParaRPr lang="en-US"/>
           </a:p>
@@ -1165,13 +1166,8 @@
           <a:p>
             <a:r>
               <a:rPr lang="en-US" dirty="0"/>
-              <a:t>Optional coding exercise for tower </a:t>
-            </a:r>
-            <a:r>
-              <a:rPr lang="en-US"/>
-              <a:t>of Hanoi</a:t>
-            </a:r>
-            <a:endParaRPr lang="en-US" dirty="0"/>
+              <a:t>Optional coding exercise for tower of Hanoi</a:t>
+            </a:r>
           </a:p>
         </p:txBody>
       </p:sp>
@@ -1390,7 +1386,7 @@
           <a:p>
             <a:fld id="{E6E52604-4630-4861-9364-F52CA104A3D5}" type="datetimeFigureOut">
               <a:rPr lang="en-US" smtClean="0"/>
-              <a:t>11/22/2022</a:t>
+              <a:t>4/17/2023</a:t>
             </a:fld>
             <a:endParaRPr lang="en-US"/>
           </a:p>
@@ -1558,7 +1554,7 @@
           <a:p>
             <a:fld id="{E6E52604-4630-4861-9364-F52CA104A3D5}" type="datetimeFigureOut">
               <a:rPr lang="en-US" smtClean="0"/>
-              <a:t>11/22/2022</a:t>
+              <a:t>4/17/2023</a:t>
             </a:fld>
             <a:endParaRPr lang="en-US"/>
           </a:p>
@@ -1736,7 +1732,7 @@
           <a:p>
             <a:fld id="{E6E52604-4630-4861-9364-F52CA104A3D5}" type="datetimeFigureOut">
               <a:rPr lang="en-US" smtClean="0"/>
-              <a:t>11/22/2022</a:t>
+              <a:t>4/17/2023</a:t>
             </a:fld>
             <a:endParaRPr lang="en-US"/>
           </a:p>
@@ -1904,7 +1900,7 @@
           <a:p>
             <a:fld id="{E6E52604-4630-4861-9364-F52CA104A3D5}" type="datetimeFigureOut">
               <a:rPr lang="en-US" smtClean="0"/>
-              <a:t>11/22/2022</a:t>
+              <a:t>4/17/2023</a:t>
             </a:fld>
             <a:endParaRPr lang="en-US"/>
           </a:p>
@@ -2149,7 +2145,7 @@
           <a:p>
             <a:fld id="{E6E52604-4630-4861-9364-F52CA104A3D5}" type="datetimeFigureOut">
               <a:rPr lang="en-US" smtClean="0"/>
-              <a:t>11/22/2022</a:t>
+              <a:t>4/17/2023</a:t>
             </a:fld>
             <a:endParaRPr lang="en-US"/>
           </a:p>
@@ -2434,7 +2430,7 @@
           <a:p>
             <a:fld id="{E6E52604-4630-4861-9364-F52CA104A3D5}" type="datetimeFigureOut">
               <a:rPr lang="en-US" smtClean="0"/>
-              <a:t>11/22/2022</a:t>
+              <a:t>4/17/2023</a:t>
             </a:fld>
             <a:endParaRPr lang="en-US"/>
           </a:p>
@@ -2853,7 +2849,7 @@
           <a:p>
             <a:fld id="{E6E52604-4630-4861-9364-F52CA104A3D5}" type="datetimeFigureOut">
               <a:rPr lang="en-US" smtClean="0"/>
-              <a:t>11/22/2022</a:t>
+              <a:t>4/17/2023</a:t>
             </a:fld>
             <a:endParaRPr lang="en-US"/>
           </a:p>
@@ -2970,7 +2966,7 @@
           <a:p>
             <a:fld id="{E6E52604-4630-4861-9364-F52CA104A3D5}" type="datetimeFigureOut">
               <a:rPr lang="en-US" smtClean="0"/>
-              <a:t>11/22/2022</a:t>
+              <a:t>4/17/2023</a:t>
             </a:fld>
             <a:endParaRPr lang="en-US"/>
           </a:p>
@@ -3065,7 +3061,7 @@
           <a:p>
             <a:fld id="{E6E52604-4630-4861-9364-F52CA104A3D5}" type="datetimeFigureOut">
               <a:rPr lang="en-US" smtClean="0"/>
-              <a:t>11/22/2022</a:t>
+              <a:t>4/17/2023</a:t>
             </a:fld>
             <a:endParaRPr lang="en-US"/>
           </a:p>
@@ -3340,7 +3336,7 @@
           <a:p>
             <a:fld id="{E6E52604-4630-4861-9364-F52CA104A3D5}" type="datetimeFigureOut">
               <a:rPr lang="en-US" smtClean="0"/>
-              <a:t>11/22/2022</a:t>
+              <a:t>4/17/2023</a:t>
             </a:fld>
             <a:endParaRPr lang="en-US"/>
           </a:p>
@@ -3592,7 +3588,7 @@
           <a:p>
             <a:fld id="{E6E52604-4630-4861-9364-F52CA104A3D5}" type="datetimeFigureOut">
               <a:rPr lang="en-US" smtClean="0"/>
-              <a:t>11/22/2022</a:t>
+              <a:t>4/17/2023</a:t>
             </a:fld>
             <a:endParaRPr lang="en-US"/>
           </a:p>
@@ -3803,7 +3799,7 @@
           <a:p>
             <a:fld id="{E6E52604-4630-4861-9364-F52CA104A3D5}" type="datetimeFigureOut">
               <a:rPr lang="en-US" smtClean="0"/>
-              <a:t>11/22/2022</a:t>
+              <a:t>4/17/2023</a:t>
             </a:fld>
             <a:endParaRPr lang="en-US"/>
           </a:p>
@@ -4425,13 +4421,18 @@
           </a:p>
           <a:p>
             <a:r>
-              <a:rPr lang="en-US" sz="4400" dirty="0">
+              <a:rPr lang="en-US" sz="4400">
                 <a:highlight>
                   <a:srgbClr val="FFFF00"/>
                 </a:highlight>
               </a:rPr>
               <a:t>__________</a:t>
             </a:r>
+            <a:endParaRPr lang="en-US" sz="4400" dirty="0">
+              <a:highlight>
+                <a:srgbClr val="FFFF00"/>
+              </a:highlight>
+            </a:endParaRPr>
           </a:p>
         </p:txBody>
       </p:sp>
@@ -7381,6 +7382,346 @@
 </p:sld>
 </file>
 
+<file path=ppt/slides/slide15.xml><?xml version="1.0" encoding="utf-8"?>
+<p:sld xmlns:a="http://schemas.openxmlformats.org/drawingml/2006/main" xmlns:r="http://schemas.openxmlformats.org/officeDocument/2006/relationships" xmlns:p="http://schemas.openxmlformats.org/presentationml/2006/main">
+  <p:cSld>
+    <p:spTree>
+      <p:nvGrpSpPr>
+        <p:cNvPr id="1" name=""/>
+        <p:cNvGrpSpPr/>
+        <p:nvPr/>
+      </p:nvGrpSpPr>
+      <p:grpSpPr>
+        <a:xfrm>
+          <a:off x="0" y="0"/>
+          <a:ext cx="0" cy="0"/>
+          <a:chOff x="0" y="0"/>
+          <a:chExt cx="0" cy="0"/>
+        </a:xfrm>
+      </p:grpSpPr>
+      <p:sp>
+        <p:nvSpPr>
+          <p:cNvPr id="2" name="Title 1">
+            <a:extLst>
+              <a:ext uri="{FF2B5EF4-FFF2-40B4-BE49-F238E27FC236}">
+                <a16:creationId xmlns:a16="http://schemas.microsoft.com/office/drawing/2014/main" id="{B7ED4A8F-4488-8830-4DA6-E9F7D82341FE}"/>
+              </a:ext>
+            </a:extLst>
+          </p:cNvPr>
+          <p:cNvSpPr>
+            <a:spLocks noGrp="1"/>
+          </p:cNvSpPr>
+          <p:nvPr>
+            <p:ph type="title"/>
+          </p:nvPr>
+        </p:nvSpPr>
+        <p:spPr/>
+        <p:txBody>
+          <a:bodyPr/>
+          <a:lstStyle/>
+          <a:p>
+            <a:r>
+              <a:rPr lang="en-US" dirty="0"/>
+              <a:t>Final HW Problem</a:t>
+            </a:r>
+          </a:p>
+        </p:txBody>
+      </p:sp>
+      <p:sp>
+        <p:nvSpPr>
+          <p:cNvPr id="4" name="Rectangle 1">
+            <a:extLst>
+              <a:ext uri="{FF2B5EF4-FFF2-40B4-BE49-F238E27FC236}">
+                <a16:creationId xmlns:a16="http://schemas.microsoft.com/office/drawing/2014/main" id="{BDBFBB29-E293-D324-3E6F-1E911FA02E88}"/>
+              </a:ext>
+            </a:extLst>
+          </p:cNvPr>
+          <p:cNvSpPr>
+            <a:spLocks noChangeArrowheads="1"/>
+          </p:cNvSpPr>
+          <p:nvPr/>
+        </p:nvSpPr>
+        <p:spPr bwMode="auto">
+          <a:xfrm>
+            <a:off x="895063" y="1834942"/>
+            <a:ext cx="7353873" cy="338554"/>
+          </a:xfrm>
+          <a:prstGeom prst="rect">
+            <a:avLst/>
+          </a:prstGeom>
+          <a:noFill/>
+          <a:ln>
+            <a:noFill/>
+          </a:ln>
+          <a:effectLst/>
+          <a:extLst>
+            <a:ext uri="{909E8E84-426E-40DD-AFC4-6F175D3DCCD1}">
+              <a14:hiddenFill xmlns:a14="http://schemas.microsoft.com/office/drawing/2010/main">
+                <a:solidFill>
+                  <a:schemeClr val="accent1"/>
+                </a:solidFill>
+              </a14:hiddenFill>
+            </a:ext>
+            <a:ext uri="{91240B29-F687-4F45-9708-019B960494DF}">
+              <a14:hiddenLine xmlns:a14="http://schemas.microsoft.com/office/drawing/2010/main" w="9525">
+                <a:solidFill>
+                  <a:schemeClr val="tx1"/>
+                </a:solidFill>
+                <a:miter lim="800000"/>
+                <a:headEnd/>
+                <a:tailEnd/>
+              </a14:hiddenLine>
+            </a:ext>
+            <a:ext uri="{AF507438-7753-43E0-B8FC-AC1667EBCBE1}">
+              <a14:hiddenEffects xmlns:a14="http://schemas.microsoft.com/office/drawing/2010/main">
+                <a:effectLst>
+                  <a:outerShdw dist="35921" dir="2700000" algn="ctr" rotWithShape="0">
+                    <a:schemeClr val="bg2"/>
+                  </a:outerShdw>
+                </a:effectLst>
+              </a14:hiddenEffects>
+            </a:ext>
+          </a:extLst>
+        </p:spPr>
+        <p:txBody>
+          <a:bodyPr vert="horz" wrap="none" lIns="91440" tIns="45720" rIns="91440" bIns="45720" numCol="1" anchor="ctr" anchorCtr="0" compatLnSpc="1">
+            <a:prstTxWarp prst="textNoShape">
+              <a:avLst/>
+            </a:prstTxWarp>
+            <a:spAutoFit/>
+          </a:bodyPr>
+          <a:lstStyle>
+            <a:lvl1pPr eaLnBrk="0" fontAlgn="base" hangingPunct="0">
+              <a:spcBef>
+                <a:spcPct val="0"/>
+              </a:spcBef>
+              <a:spcAft>
+                <a:spcPct val="0"/>
+              </a:spcAft>
+              <a:defRPr>
+                <a:solidFill>
+                  <a:schemeClr val="tx1"/>
+                </a:solidFill>
+                <a:latin typeface="Arial" panose="020B0604020202020204" pitchFamily="34" charset="0"/>
+              </a:defRPr>
+            </a:lvl1pPr>
+            <a:lvl2pPr eaLnBrk="0" fontAlgn="base" hangingPunct="0">
+              <a:spcBef>
+                <a:spcPct val="0"/>
+              </a:spcBef>
+              <a:spcAft>
+                <a:spcPct val="0"/>
+              </a:spcAft>
+              <a:defRPr>
+                <a:solidFill>
+                  <a:schemeClr val="tx1"/>
+                </a:solidFill>
+                <a:latin typeface="Arial" panose="020B0604020202020204" pitchFamily="34" charset="0"/>
+              </a:defRPr>
+            </a:lvl2pPr>
+            <a:lvl3pPr eaLnBrk="0" fontAlgn="base" hangingPunct="0">
+              <a:spcBef>
+                <a:spcPct val="0"/>
+              </a:spcBef>
+              <a:spcAft>
+                <a:spcPct val="0"/>
+              </a:spcAft>
+              <a:defRPr>
+                <a:solidFill>
+                  <a:schemeClr val="tx1"/>
+                </a:solidFill>
+                <a:latin typeface="Arial" panose="020B0604020202020204" pitchFamily="34" charset="0"/>
+              </a:defRPr>
+            </a:lvl3pPr>
+            <a:lvl4pPr eaLnBrk="0" fontAlgn="base" hangingPunct="0">
+              <a:spcBef>
+                <a:spcPct val="0"/>
+              </a:spcBef>
+              <a:spcAft>
+                <a:spcPct val="0"/>
+              </a:spcAft>
+              <a:defRPr>
+                <a:solidFill>
+                  <a:schemeClr val="tx1"/>
+                </a:solidFill>
+                <a:latin typeface="Arial" panose="020B0604020202020204" pitchFamily="34" charset="0"/>
+              </a:defRPr>
+            </a:lvl4pPr>
+            <a:lvl5pPr eaLnBrk="0" fontAlgn="base" hangingPunct="0">
+              <a:spcBef>
+                <a:spcPct val="0"/>
+              </a:spcBef>
+              <a:spcAft>
+                <a:spcPct val="0"/>
+              </a:spcAft>
+              <a:defRPr>
+                <a:solidFill>
+                  <a:schemeClr val="tx1"/>
+                </a:solidFill>
+                <a:latin typeface="Arial" panose="020B0604020202020204" pitchFamily="34" charset="0"/>
+              </a:defRPr>
+            </a:lvl5pPr>
+            <a:lvl6pPr eaLnBrk="0" fontAlgn="base" hangingPunct="0">
+              <a:spcBef>
+                <a:spcPct val="0"/>
+              </a:spcBef>
+              <a:spcAft>
+                <a:spcPct val="0"/>
+              </a:spcAft>
+              <a:defRPr>
+                <a:solidFill>
+                  <a:schemeClr val="tx1"/>
+                </a:solidFill>
+                <a:latin typeface="Arial" panose="020B0604020202020204" pitchFamily="34" charset="0"/>
+              </a:defRPr>
+            </a:lvl6pPr>
+            <a:lvl7pPr eaLnBrk="0" fontAlgn="base" hangingPunct="0">
+              <a:spcBef>
+                <a:spcPct val="0"/>
+              </a:spcBef>
+              <a:spcAft>
+                <a:spcPct val="0"/>
+              </a:spcAft>
+              <a:defRPr>
+                <a:solidFill>
+                  <a:schemeClr val="tx1"/>
+                </a:solidFill>
+                <a:latin typeface="Arial" panose="020B0604020202020204" pitchFamily="34" charset="0"/>
+              </a:defRPr>
+            </a:lvl7pPr>
+            <a:lvl8pPr eaLnBrk="0" fontAlgn="base" hangingPunct="0">
+              <a:spcBef>
+                <a:spcPct val="0"/>
+              </a:spcBef>
+              <a:spcAft>
+                <a:spcPct val="0"/>
+              </a:spcAft>
+              <a:defRPr>
+                <a:solidFill>
+                  <a:schemeClr val="tx1"/>
+                </a:solidFill>
+                <a:latin typeface="Arial" panose="020B0604020202020204" pitchFamily="34" charset="0"/>
+              </a:defRPr>
+            </a:lvl8pPr>
+            <a:lvl9pPr eaLnBrk="0" fontAlgn="base" hangingPunct="0">
+              <a:spcBef>
+                <a:spcPct val="0"/>
+              </a:spcBef>
+              <a:spcAft>
+                <a:spcPct val="0"/>
+              </a:spcAft>
+              <a:defRPr>
+                <a:solidFill>
+                  <a:schemeClr val="tx1"/>
+                </a:solidFill>
+                <a:latin typeface="Arial" panose="020B0604020202020204" pitchFamily="34" charset="0"/>
+              </a:defRPr>
+            </a:lvl9pPr>
+          </a:lstStyle>
+          <a:p>
+            <a:pPr marL="0" marR="0" lvl="0" indent="0" algn="l" defTabSz="914400" rtl="0" eaLnBrk="0" fontAlgn="base" latinLnBrk="0" hangingPunct="0">
+              <a:lnSpc>
+                <a:spcPct val="100000"/>
+              </a:lnSpc>
+              <a:spcBef>
+                <a:spcPct val="0"/>
+              </a:spcBef>
+              <a:spcAft>
+                <a:spcPct val="0"/>
+              </a:spcAft>
+              <a:buClrTx/>
+              <a:buSzTx/>
+              <a:buFontTx/>
+              <a:buNone/>
+              <a:tabLst/>
+            </a:pPr>
+            <a:r>
+              <a:rPr kumimoji="0" lang="en-US" altLang="en-US" sz="1600" b="0" i="0" u="none" strike="noStrike" cap="none" normalizeH="0" baseline="0" dirty="0">
+                <a:ln>
+                  <a:noFill/>
+                </a:ln>
+                <a:solidFill>
+                  <a:srgbClr val="242424"/>
+                </a:solidFill>
+                <a:effectLst/>
+                <a:latin typeface="Segoe UI" panose="020B0502040204020203" pitchFamily="34" charset="0"/>
+                <a:cs typeface="Segoe UI" panose="020B0502040204020203" pitchFamily="34" charset="0"/>
+              </a:rPr>
+              <a:t>Courtesy of Dr. Hollingsworth- the diagram below might help with this problem</a:t>
+            </a:r>
+            <a:endParaRPr kumimoji="0" lang="en-US" altLang="en-US" sz="2800" b="0" i="0" u="none" strike="noStrike" cap="none" normalizeH="0" baseline="0" dirty="0">
+              <a:ln>
+                <a:noFill/>
+              </a:ln>
+              <a:solidFill>
+                <a:schemeClr val="tx1"/>
+              </a:solidFill>
+              <a:effectLst/>
+              <a:latin typeface="Arial" panose="020B0604020202020204" pitchFamily="34" charset="0"/>
+            </a:endParaRPr>
+          </a:p>
+        </p:txBody>
+      </p:sp>
+      <p:pic>
+        <p:nvPicPr>
+          <p:cNvPr id="1026" name="Picture 2" descr="largest sub sequence">
+            <a:extLst>
+              <a:ext uri="{FF2B5EF4-FFF2-40B4-BE49-F238E27FC236}">
+                <a16:creationId xmlns:a16="http://schemas.microsoft.com/office/drawing/2014/main" id="{81DA025B-86D6-5F71-BD0E-012E7449F16F}"/>
+              </a:ext>
+            </a:extLst>
+          </p:cNvPr>
+          <p:cNvPicPr>
+            <a:picLocks noChangeAspect="1" noChangeArrowheads="1"/>
+          </p:cNvPicPr>
+          <p:nvPr/>
+        </p:nvPicPr>
+        <p:blipFill>
+          <a:blip r:embed="rId2">
+            <a:extLst>
+              <a:ext uri="{28A0092B-C50C-407E-A947-70E740481C1C}">
+                <a14:useLocalDpi xmlns:a14="http://schemas.microsoft.com/office/drawing/2010/main" val="0"/>
+              </a:ext>
+            </a:extLst>
+          </a:blip>
+          <a:srcRect/>
+          <a:stretch>
+            <a:fillRect/>
+          </a:stretch>
+        </p:blipFill>
+        <p:spPr bwMode="auto">
+          <a:xfrm>
+            <a:off x="738287" y="2590800"/>
+            <a:ext cx="7288024" cy="3581400"/>
+          </a:xfrm>
+          <a:prstGeom prst="rect">
+            <a:avLst/>
+          </a:prstGeom>
+          <a:noFill/>
+          <a:extLst>
+            <a:ext uri="{909E8E84-426E-40DD-AFC4-6F175D3DCCD1}">
+              <a14:hiddenFill xmlns:a14="http://schemas.microsoft.com/office/drawing/2010/main">
+                <a:solidFill>
+                  <a:srgbClr val="FFFFFF"/>
+                </a:solidFill>
+              </a14:hiddenFill>
+            </a:ext>
+          </a:extLst>
+        </p:spPr>
+      </p:pic>
+    </p:spTree>
+    <p:extLst>
+      <p:ext uri="{BB962C8B-B14F-4D97-AF65-F5344CB8AC3E}">
+        <p14:creationId xmlns:p14="http://schemas.microsoft.com/office/powerpoint/2010/main" val="2588213966"/>
+      </p:ext>
+    </p:extLst>
+  </p:cSld>
+  <p:clrMapOvr>
+    <a:masterClrMapping/>
+  </p:clrMapOvr>
+</p:sld>
+</file>
+
 <file path=ppt/slides/slide2.xml><?xml version="1.0" encoding="utf-8"?>
 <p:sld xmlns:a="http://schemas.openxmlformats.org/drawingml/2006/main" xmlns:r="http://schemas.openxmlformats.org/officeDocument/2006/relationships" xmlns:p="http://schemas.openxmlformats.org/presentationml/2006/main">
   <p:cSld>
@@ -10546,6 +10887,36 @@
           </a:p>
         </p:txBody>
       </p:sp>
+      <p:pic>
+        <p:nvPicPr>
+          <p:cNvPr id="4" name="Picture 3">
+            <a:extLst>
+              <a:ext uri="{FF2B5EF4-FFF2-40B4-BE49-F238E27FC236}">
+                <a16:creationId xmlns:a16="http://schemas.microsoft.com/office/drawing/2014/main" id="{AC11AFBA-39D6-3F6C-9C3F-182DDD177666}"/>
+              </a:ext>
+            </a:extLst>
+          </p:cNvPr>
+          <p:cNvPicPr>
+            <a:picLocks noChangeAspect="1"/>
+          </p:cNvPicPr>
+          <p:nvPr/>
+        </p:nvPicPr>
+        <p:blipFill>
+          <a:blip r:embed="rId2"/>
+          <a:stretch>
+            <a:fillRect/>
+          </a:stretch>
+        </p:blipFill>
+        <p:spPr>
+          <a:xfrm>
+            <a:off x="3018570" y="5133734"/>
+            <a:ext cx="6125430" cy="1724266"/>
+          </a:xfrm>
+          <a:prstGeom prst="rect">
+            <a:avLst/>
+          </a:prstGeom>
+        </p:spPr>
+      </p:pic>
     </p:spTree>
     <p:extLst>
       <p:ext uri="{BB962C8B-B14F-4D97-AF65-F5344CB8AC3E}">
@@ -11335,18 +11706,18 @@
 </file>
 
 <file path=customXml/item2.xml><?xml version="1.0" encoding="utf-8"?>
-<p:properties xmlns:p="http://schemas.microsoft.com/office/2006/metadata/properties" xmlns:xsi="http://www.w3.org/2001/XMLSchema-instance" xmlns:pc="http://schemas.microsoft.com/office/infopath/2007/PartnerControls">
-  <documentManagement/>
-</p:properties>
-</file>
-
-<file path=customXml/item3.xml><?xml version="1.0" encoding="utf-8"?>
 <?mso-contentType ?>
 <FormTemplates xmlns="http://schemas.microsoft.com/sharepoint/v3/contenttype/forms">
   <Display>DocumentLibraryForm</Display>
   <Edit>DocumentLibraryForm</Edit>
   <New>DocumentLibraryForm</New>
 </FormTemplates>
+</file>
+
+<file path=customXml/item3.xml><?xml version="1.0" encoding="utf-8"?>
+<p:properties xmlns:p="http://schemas.microsoft.com/office/2006/metadata/properties" xmlns:xsi="http://www.w3.org/2001/XMLSchema-instance" xmlns:pc="http://schemas.microsoft.com/office/infopath/2007/PartnerControls">
+  <documentManagement/>
+</p:properties>
 </file>
 
 <file path=customXml/itemProps1.xml><?xml version="1.0" encoding="utf-8"?>
@@ -11368,18 +11739,18 @@
 </file>
 
 <file path=customXml/itemProps2.xml><?xml version="1.0" encoding="utf-8"?>
+<ds:datastoreItem xmlns:ds="http://schemas.openxmlformats.org/officeDocument/2006/customXml" ds:itemID="{468F51B2-1CC2-431D-A1E6-36E9125CDBF8}">
+  <ds:schemaRefs>
+    <ds:schemaRef ds:uri="http://schemas.microsoft.com/sharepoint/v3/contenttype/forms"/>
+  </ds:schemaRefs>
+</ds:datastoreItem>
+</file>
+
+<file path=customXml/itemProps3.xml><?xml version="1.0" encoding="utf-8"?>
 <ds:datastoreItem xmlns:ds="http://schemas.openxmlformats.org/officeDocument/2006/customXml" ds:itemID="{7FF94FC0-E081-4FF1-A581-A49E7DE311BA}">
   <ds:schemaRefs>
     <ds:schemaRef ds:uri="http://schemas.microsoft.com/office/2006/metadata/properties"/>
     <ds:schemaRef ds:uri="http://schemas.microsoft.com/office/infopath/2007/PartnerControls"/>
   </ds:schemaRefs>
 </ds:datastoreItem>
-</file>
-
-<file path=customXml/itemProps3.xml><?xml version="1.0" encoding="utf-8"?>
-<ds:datastoreItem xmlns:ds="http://schemas.openxmlformats.org/officeDocument/2006/customXml" ds:itemID="{468F51B2-1CC2-431D-A1E6-36E9125CDBF8}">
-  <ds:schemaRefs>
-    <ds:schemaRef ds:uri="http://schemas.microsoft.com/sharepoint/v3/contenttype/forms"/>
-  </ds:schemaRefs>
-</ds:datastoreItem>
 </file>
</xml_diff>